<commit_message>
push.sh at 2019年06月10日 15:16:07
</commit_message>
<xml_diff>
--- a/chap/img/thesis_structure.pptx
+++ b/chap/img/thesis_structure.pptx
@@ -243,7 +243,7 @@
           <a:p>
             <a:fld id="{6FF9B85E-ACCE-4724-953F-C34FA7DE9BB2}" type="datetimeFigureOut">
               <a:rPr lang="en-US" smtClean="0"/>
-              <a:t>4/17/2019</a:t>
+              <a:t>6/10/2019</a:t>
             </a:fld>
             <a:endParaRPr lang="en-US"/>
           </a:p>
@@ -413,7 +413,7 @@
           <a:p>
             <a:fld id="{6FF9B85E-ACCE-4724-953F-C34FA7DE9BB2}" type="datetimeFigureOut">
               <a:rPr lang="en-US" smtClean="0"/>
-              <a:t>4/17/2019</a:t>
+              <a:t>6/10/2019</a:t>
             </a:fld>
             <a:endParaRPr lang="en-US"/>
           </a:p>
@@ -593,7 +593,7 @@
           <a:p>
             <a:fld id="{6FF9B85E-ACCE-4724-953F-C34FA7DE9BB2}" type="datetimeFigureOut">
               <a:rPr lang="en-US" smtClean="0"/>
-              <a:t>4/17/2019</a:t>
+              <a:t>6/10/2019</a:t>
             </a:fld>
             <a:endParaRPr lang="en-US"/>
           </a:p>
@@ -763,7 +763,7 @@
           <a:p>
             <a:fld id="{6FF9B85E-ACCE-4724-953F-C34FA7DE9BB2}" type="datetimeFigureOut">
               <a:rPr lang="en-US" smtClean="0"/>
-              <a:t>4/17/2019</a:t>
+              <a:t>6/10/2019</a:t>
             </a:fld>
             <a:endParaRPr lang="en-US"/>
           </a:p>
@@ -1007,7 +1007,7 @@
           <a:p>
             <a:fld id="{6FF9B85E-ACCE-4724-953F-C34FA7DE9BB2}" type="datetimeFigureOut">
               <a:rPr lang="en-US" smtClean="0"/>
-              <a:t>4/17/2019</a:t>
+              <a:t>6/10/2019</a:t>
             </a:fld>
             <a:endParaRPr lang="en-US"/>
           </a:p>
@@ -1239,7 +1239,7 @@
           <a:p>
             <a:fld id="{6FF9B85E-ACCE-4724-953F-C34FA7DE9BB2}" type="datetimeFigureOut">
               <a:rPr lang="en-US" smtClean="0"/>
-              <a:t>4/17/2019</a:t>
+              <a:t>6/10/2019</a:t>
             </a:fld>
             <a:endParaRPr lang="en-US"/>
           </a:p>
@@ -1606,7 +1606,7 @@
           <a:p>
             <a:fld id="{6FF9B85E-ACCE-4724-953F-C34FA7DE9BB2}" type="datetimeFigureOut">
               <a:rPr lang="en-US" smtClean="0"/>
-              <a:t>4/17/2019</a:t>
+              <a:t>6/10/2019</a:t>
             </a:fld>
             <a:endParaRPr lang="en-US"/>
           </a:p>
@@ -1724,7 +1724,7 @@
           <a:p>
             <a:fld id="{6FF9B85E-ACCE-4724-953F-C34FA7DE9BB2}" type="datetimeFigureOut">
               <a:rPr lang="en-US" smtClean="0"/>
-              <a:t>4/17/2019</a:t>
+              <a:t>6/10/2019</a:t>
             </a:fld>
             <a:endParaRPr lang="en-US"/>
           </a:p>
@@ -1819,7 +1819,7 @@
           <a:p>
             <a:fld id="{6FF9B85E-ACCE-4724-953F-C34FA7DE9BB2}" type="datetimeFigureOut">
               <a:rPr lang="en-US" smtClean="0"/>
-              <a:t>4/17/2019</a:t>
+              <a:t>6/10/2019</a:t>
             </a:fld>
             <a:endParaRPr lang="en-US"/>
           </a:p>
@@ -2096,7 +2096,7 @@
           <a:p>
             <a:fld id="{6FF9B85E-ACCE-4724-953F-C34FA7DE9BB2}" type="datetimeFigureOut">
               <a:rPr lang="en-US" smtClean="0"/>
-              <a:t>4/17/2019</a:t>
+              <a:t>6/10/2019</a:t>
             </a:fld>
             <a:endParaRPr lang="en-US"/>
           </a:p>
@@ -2353,7 +2353,7 @@
           <a:p>
             <a:fld id="{6FF9B85E-ACCE-4724-953F-C34FA7DE9BB2}" type="datetimeFigureOut">
               <a:rPr lang="en-US" smtClean="0"/>
-              <a:t>4/17/2019</a:t>
+              <a:t>6/10/2019</a:t>
             </a:fld>
             <a:endParaRPr lang="en-US"/>
           </a:p>
@@ -2566,7 +2566,7 @@
           <a:p>
             <a:fld id="{6FF9B85E-ACCE-4724-953F-C34FA7DE9BB2}" type="datetimeFigureOut">
               <a:rPr lang="en-US" smtClean="0"/>
-              <a:t>4/17/2019</a:t>
+              <a:t>6/10/2019</a:t>
             </a:fld>
             <a:endParaRPr lang="en-US"/>
           </a:p>
@@ -2979,7 +2979,7 @@
         </p:nvSpPr>
         <p:spPr>
           <a:xfrm>
-            <a:off x="1926631" y="855411"/>
+            <a:off x="1926631" y="691289"/>
             <a:ext cx="2904249" cy="690079"/>
           </a:xfrm>
           <a:prstGeom prst="rect">
@@ -3014,41 +3014,51 @@
           <a:p>
             <a:pPr algn="ctr"/>
             <a:r>
-              <a:rPr lang="zh-CN" altLang="en-US" dirty="0">
+              <a:rPr lang="zh-CN" altLang="en-US" sz="1600" dirty="0">
                 <a:solidFill>
                   <a:schemeClr val="tx1"/>
                 </a:solidFill>
-                <a:latin typeface="Times New Roman" panose="02020603050405020304" pitchFamily="18" charset="0"/>
-                <a:ea typeface="宋体" panose="02010600030101010101" pitchFamily="2" charset="-122"/>
+                <a:latin typeface="黑体" panose="02010609060101010101" pitchFamily="49" charset="-122"/>
+                <a:ea typeface="黑体" panose="02010609060101010101" pitchFamily="49" charset="-122"/>
               </a:rPr>
               <a:t>第一章</a:t>
             </a:r>
-            <a:endParaRPr lang="en-US" altLang="zh-CN" dirty="0">
+            <a:endParaRPr lang="en-US" altLang="zh-CN" sz="1600" dirty="0">
               <a:solidFill>
                 <a:schemeClr val="tx1"/>
               </a:solidFill>
-              <a:latin typeface="Times New Roman" panose="02020603050405020304" pitchFamily="18" charset="0"/>
-              <a:ea typeface="宋体" panose="02010600030101010101" pitchFamily="2" charset="-122"/>
+              <a:latin typeface="黑体" panose="02010609060101010101" pitchFamily="49" charset="-122"/>
+              <a:ea typeface="黑体" panose="02010609060101010101" pitchFamily="49" charset="-122"/>
             </a:endParaRPr>
           </a:p>
           <a:p>
             <a:pPr algn="ctr"/>
             <a:r>
-              <a:rPr lang="zh-CN" altLang="en-US" dirty="0">
+              <a:rPr lang="zh-CN" altLang="en-US" sz="1600" dirty="0">
                 <a:solidFill>
                   <a:schemeClr val="tx1"/>
                 </a:solidFill>
-                <a:latin typeface="Times New Roman" panose="02020603050405020304" pitchFamily="18" charset="0"/>
-                <a:ea typeface="宋体" panose="02010600030101010101" pitchFamily="2" charset="-122"/>
+                <a:latin typeface="黑体" panose="02010609060101010101" pitchFamily="49" charset="-122"/>
+                <a:ea typeface="黑体" panose="02010609060101010101" pitchFamily="49" charset="-122"/>
               </a:rPr>
-              <a:t>研究背景、意义、现状</a:t>
-            </a:r>
-            <a:endParaRPr lang="en-US" dirty="0">
+              <a:t>研究背景、意义、</a:t>
+            </a:r>
+            <a:r>
+              <a:rPr lang="zh-CN" altLang="en-US" sz="1600" dirty="0" smtClean="0">
+                <a:solidFill>
+                  <a:schemeClr val="tx1"/>
+                </a:solidFill>
+                <a:latin typeface="黑体" panose="02010609060101010101" pitchFamily="49" charset="-122"/>
+                <a:ea typeface="黑体" panose="02010609060101010101" pitchFamily="49" charset="-122"/>
+              </a:rPr>
+              <a:t>现状</a:t>
+            </a:r>
+            <a:endParaRPr lang="en-US" altLang="zh-CN" sz="1600" dirty="0" smtClean="0">
               <a:solidFill>
                 <a:schemeClr val="tx1"/>
               </a:solidFill>
-              <a:latin typeface="Times New Roman" panose="02020603050405020304" pitchFamily="18" charset="0"/>
-              <a:ea typeface="宋体" panose="02010600030101010101" pitchFamily="2" charset="-122"/>
+              <a:latin typeface="黑体" panose="02010609060101010101" pitchFamily="49" charset="-122"/>
+              <a:ea typeface="黑体" panose="02010609060101010101" pitchFamily="49" charset="-122"/>
             </a:endParaRPr>
           </a:p>
         </p:txBody>
@@ -3061,8 +3071,8 @@
         </p:nvGrpSpPr>
         <p:grpSpPr>
           <a:xfrm>
-            <a:off x="1041952" y="2347697"/>
-            <a:ext cx="4673601" cy="1738368"/>
+            <a:off x="1041947" y="2004646"/>
+            <a:ext cx="4673601" cy="2427106"/>
             <a:chOff x="-1517865" y="2636269"/>
             <a:chExt cx="8518558" cy="2796411"/>
           </a:xfrm>
@@ -3109,71 +3119,31 @@
             <a:lstStyle/>
             <a:p>
               <a:pPr algn="ctr"/>
-              <a:r>
-                <a:rPr lang="zh-CN" altLang="en-US" dirty="0">
-                  <a:solidFill>
-                    <a:schemeClr val="tx1"/>
-                  </a:solidFill>
-                  <a:latin typeface="Times New Roman" panose="02020603050405020304" pitchFamily="18" charset="0"/>
-                  <a:ea typeface="宋体" panose="02010600030101010101" pitchFamily="2" charset="-122"/>
-                </a:rPr>
-                <a:t>第二章</a:t>
-              </a:r>
-              <a:endParaRPr lang="en-US" altLang="zh-CN" dirty="0">
+              <a:endParaRPr lang="en-US" altLang="zh-CN" sz="1600" dirty="0">
                 <a:solidFill>
                   <a:schemeClr val="tx1"/>
                 </a:solidFill>
-                <a:latin typeface="Times New Roman" panose="02020603050405020304" pitchFamily="18" charset="0"/>
+                <a:latin typeface="宋体" panose="02010600030101010101" pitchFamily="2" charset="-122"/>
                 <a:ea typeface="宋体" panose="02010600030101010101" pitchFamily="2" charset="-122"/>
               </a:endParaRPr>
             </a:p>
             <a:p>
               <a:pPr algn="ctr"/>
-              <a:r>
-                <a:rPr lang="zh-CN" altLang="en-US" dirty="0">
-                  <a:solidFill>
-                    <a:schemeClr val="tx1"/>
-                  </a:solidFill>
-                  <a:latin typeface="Times New Roman" panose="02020603050405020304" pitchFamily="18" charset="0"/>
-                  <a:ea typeface="宋体" panose="02010600030101010101" pitchFamily="2" charset="-122"/>
-                </a:rPr>
-                <a:t>详细介绍现有算法</a:t>
-              </a:r>
-              <a:endParaRPr lang="en-US" altLang="zh-CN" dirty="0">
+              <a:endParaRPr lang="en-US" altLang="zh-CN" sz="1600" dirty="0">
                 <a:solidFill>
                   <a:schemeClr val="tx1"/>
                 </a:solidFill>
-                <a:latin typeface="Times New Roman" panose="02020603050405020304" pitchFamily="18" charset="0"/>
+                <a:latin typeface="宋体" panose="02010600030101010101" pitchFamily="2" charset="-122"/>
                 <a:ea typeface="宋体" panose="02010600030101010101" pitchFamily="2" charset="-122"/>
               </a:endParaRPr>
             </a:p>
             <a:p>
               <a:pPr algn="ctr"/>
-              <a:endParaRPr lang="en-US" altLang="zh-CN" dirty="0">
+              <a:endParaRPr lang="en-US" sz="1600" dirty="0">
                 <a:solidFill>
                   <a:schemeClr val="tx1"/>
                 </a:solidFill>
-                <a:latin typeface="Times New Roman" panose="02020603050405020304" pitchFamily="18" charset="0"/>
-                <a:ea typeface="宋体" panose="02010600030101010101" pitchFamily="2" charset="-122"/>
-              </a:endParaRPr>
-            </a:p>
-            <a:p>
-              <a:pPr algn="ctr"/>
-              <a:endParaRPr lang="en-US" altLang="zh-CN" dirty="0">
-                <a:solidFill>
-                  <a:schemeClr val="tx1"/>
-                </a:solidFill>
-                <a:latin typeface="Times New Roman" panose="02020603050405020304" pitchFamily="18" charset="0"/>
-                <a:ea typeface="宋体" panose="02010600030101010101" pitchFamily="2" charset="-122"/>
-              </a:endParaRPr>
-            </a:p>
-            <a:p>
-              <a:pPr algn="ctr"/>
-              <a:endParaRPr lang="en-US" dirty="0">
-                <a:solidFill>
-                  <a:schemeClr val="tx1"/>
-                </a:solidFill>
-                <a:latin typeface="Times New Roman" panose="02020603050405020304" pitchFamily="18" charset="0"/>
+                <a:latin typeface="宋体" panose="02010600030101010101" pitchFamily="2" charset="-122"/>
                 <a:ea typeface="宋体" panose="02010600030101010101" pitchFamily="2" charset="-122"/>
               </a:endParaRPr>
             </a:p>
@@ -3187,8 +3157,8 @@
           </p:nvSpPr>
           <p:spPr>
             <a:xfrm>
-              <a:off x="-1250233" y="4034475"/>
-              <a:ext cx="3496379" cy="1219790"/>
+              <a:off x="-1157622" y="3284598"/>
+              <a:ext cx="3659423" cy="1994854"/>
             </a:xfrm>
             <a:prstGeom prst="rect">
               <a:avLst/>
@@ -3198,6 +3168,7 @@
               <a:solidFill>
                 <a:schemeClr val="tx1"/>
               </a:solidFill>
+              <a:prstDash val="sysDash"/>
             </a:ln>
           </p:spPr>
           <p:style>
@@ -3221,50 +3192,11 @@
             <a:lstStyle/>
             <a:p>
               <a:pPr algn="ctr"/>
-              <a:r>
-                <a:rPr lang="zh-CN" altLang="en-US" dirty="0">
-                  <a:solidFill>
-                    <a:schemeClr val="tx1"/>
-                  </a:solidFill>
-                  <a:latin typeface="Times New Roman" panose="02020603050405020304" pitchFamily="18" charset="0"/>
-                  <a:ea typeface="宋体" panose="02010600030101010101" pitchFamily="2" charset="-122"/>
-                </a:rPr>
-                <a:t>主要方法</a:t>
-              </a:r>
-              <a:r>
-                <a:rPr lang="en-US" altLang="zh-CN" dirty="0">
-                  <a:solidFill>
-                    <a:schemeClr val="tx1"/>
-                  </a:solidFill>
-                  <a:latin typeface="Times New Roman" panose="02020603050405020304" pitchFamily="18" charset="0"/>
-                  <a:ea typeface="宋体" panose="02010600030101010101" pitchFamily="2" charset="-122"/>
-                </a:rPr>
-                <a:t/>
-              </a:r>
-              <a:br>
-                <a:rPr lang="en-US" altLang="zh-CN" dirty="0">
-                  <a:solidFill>
-                    <a:schemeClr val="tx1"/>
-                  </a:solidFill>
-                  <a:latin typeface="Times New Roman" panose="02020603050405020304" pitchFamily="18" charset="0"/>
-                  <a:ea typeface="宋体" panose="02010600030101010101" pitchFamily="2" charset="-122"/>
-                </a:rPr>
-              </a:br>
-              <a:r>
-                <a:rPr lang="zh-CN" altLang="en-US" dirty="0">
-                  <a:solidFill>
-                    <a:schemeClr val="tx1"/>
-                  </a:solidFill>
-                  <a:latin typeface="Times New Roman" panose="02020603050405020304" pitchFamily="18" charset="0"/>
-                  <a:ea typeface="宋体" panose="02010600030101010101" pitchFamily="2" charset="-122"/>
-                </a:rPr>
-                <a:t>深度神经网络</a:t>
-              </a:r>
-              <a:endParaRPr lang="en-US" dirty="0">
+              <a:endParaRPr lang="en-US" sz="1600" dirty="0">
                 <a:solidFill>
                   <a:schemeClr val="tx1"/>
                 </a:solidFill>
-                <a:latin typeface="Times New Roman" panose="02020603050405020304" pitchFamily="18" charset="0"/>
+                <a:latin typeface="宋体" panose="02010600030101010101" pitchFamily="2" charset="-122"/>
                 <a:ea typeface="宋体" panose="02010600030101010101" pitchFamily="2" charset="-122"/>
               </a:endParaRPr>
             </a:p>
@@ -3278,8 +3210,8 @@
           </p:nvSpPr>
           <p:spPr>
             <a:xfrm>
-              <a:off x="3306411" y="4034475"/>
-              <a:ext cx="3496379" cy="1219790"/>
+              <a:off x="2862045" y="3284598"/>
+              <a:ext cx="3778391" cy="1994854"/>
             </a:xfrm>
             <a:prstGeom prst="rect">
               <a:avLst/>
@@ -3289,6 +3221,7 @@
               <a:solidFill>
                 <a:schemeClr val="tx1"/>
               </a:solidFill>
+              <a:prstDash val="sysDash"/>
             </a:ln>
           </p:spPr>
           <p:style>
@@ -3312,50 +3245,11 @@
             <a:lstStyle/>
             <a:p>
               <a:pPr algn="ctr"/>
-              <a:r>
-                <a:rPr lang="zh-CN" altLang="en-US" dirty="0">
-                  <a:solidFill>
-                    <a:schemeClr val="tx1"/>
-                  </a:solidFill>
-                  <a:latin typeface="Times New Roman" panose="02020603050405020304" pitchFamily="18" charset="0"/>
-                  <a:ea typeface="宋体" panose="02010600030101010101" pitchFamily="2" charset="-122"/>
-                </a:rPr>
-                <a:t>主要研究问题</a:t>
-              </a:r>
-              <a:r>
-                <a:rPr lang="en-US" altLang="zh-CN" dirty="0">
-                  <a:solidFill>
-                    <a:schemeClr val="tx1"/>
-                  </a:solidFill>
-                  <a:latin typeface="Times New Roman" panose="02020603050405020304" pitchFamily="18" charset="0"/>
-                  <a:ea typeface="宋体" panose="02010600030101010101" pitchFamily="2" charset="-122"/>
-                </a:rPr>
-                <a:t/>
-              </a:r>
-              <a:br>
-                <a:rPr lang="en-US" altLang="zh-CN" dirty="0">
-                  <a:solidFill>
-                    <a:schemeClr val="tx1"/>
-                  </a:solidFill>
-                  <a:latin typeface="Times New Roman" panose="02020603050405020304" pitchFamily="18" charset="0"/>
-                  <a:ea typeface="宋体" panose="02010600030101010101" pitchFamily="2" charset="-122"/>
-                </a:rPr>
-              </a:br>
-              <a:r>
-                <a:rPr lang="zh-CN" altLang="en-US" dirty="0">
-                  <a:solidFill>
-                    <a:schemeClr val="tx1"/>
-                  </a:solidFill>
-                  <a:latin typeface="Times New Roman" panose="02020603050405020304" pitchFamily="18" charset="0"/>
-                  <a:ea typeface="宋体" panose="02010600030101010101" pitchFamily="2" charset="-122"/>
-                </a:rPr>
-                <a:t>像素级目标跟踪</a:t>
-              </a:r>
-              <a:endParaRPr lang="en-US" dirty="0">
+              <a:endParaRPr lang="en-US" sz="1600" dirty="0">
                 <a:solidFill>
                   <a:schemeClr val="tx1"/>
                 </a:solidFill>
-                <a:latin typeface="Times New Roman" panose="02020603050405020304" pitchFamily="18" charset="0"/>
+                <a:latin typeface="宋体" panose="02010600030101010101" pitchFamily="2" charset="-122"/>
                 <a:ea typeface="宋体" panose="02010600030101010101" pitchFamily="2" charset="-122"/>
               </a:endParaRPr>
             </a:p>
@@ -3370,8 +3264,8 @@
         </p:nvSpPr>
         <p:spPr>
           <a:xfrm>
-            <a:off x="2117629" y="5060632"/>
-            <a:ext cx="2530227" cy="680028"/>
+            <a:off x="922740" y="4867401"/>
+            <a:ext cx="4902921" cy="1546153"/>
           </a:xfrm>
           <a:prstGeom prst="rect">
             <a:avLst/>
@@ -3404,50 +3298,11 @@
           <a:lstStyle/>
           <a:p>
             <a:pPr algn="ctr"/>
-            <a:r>
-              <a:rPr lang="zh-CN" altLang="en-US" dirty="0">
-                <a:solidFill>
-                  <a:schemeClr val="tx1"/>
-                </a:solidFill>
-                <a:latin typeface="Times New Roman" panose="02020603050405020304" pitchFamily="18" charset="0"/>
-                <a:ea typeface="宋体" panose="02010600030101010101" pitchFamily="2" charset="-122"/>
-              </a:rPr>
-              <a:t>第三章</a:t>
-            </a:r>
-            <a:r>
-              <a:rPr lang="en-US" altLang="zh-CN" dirty="0">
-                <a:solidFill>
-                  <a:schemeClr val="tx1"/>
-                </a:solidFill>
-                <a:latin typeface="Times New Roman" panose="02020603050405020304" pitchFamily="18" charset="0"/>
-                <a:ea typeface="宋体" panose="02010600030101010101" pitchFamily="2" charset="-122"/>
-              </a:rPr>
-              <a:t/>
-            </a:r>
-            <a:br>
-              <a:rPr lang="en-US" altLang="zh-CN" dirty="0">
-                <a:solidFill>
-                  <a:schemeClr val="tx1"/>
-                </a:solidFill>
-                <a:latin typeface="Times New Roman" panose="02020603050405020304" pitchFamily="18" charset="0"/>
-                <a:ea typeface="宋体" panose="02010600030101010101" pitchFamily="2" charset="-122"/>
-              </a:rPr>
-            </a:br>
-            <a:r>
-              <a:rPr lang="zh-CN" altLang="en-US" dirty="0">
-                <a:solidFill>
-                  <a:schemeClr val="tx1"/>
-                </a:solidFill>
-                <a:latin typeface="Times New Roman" panose="02020603050405020304" pitchFamily="18" charset="0"/>
-                <a:ea typeface="宋体" panose="02010600030101010101" pitchFamily="2" charset="-122"/>
-              </a:rPr>
-              <a:t>本研究的理论创新</a:t>
-            </a:r>
-            <a:endParaRPr lang="en-US" dirty="0">
+            <a:endParaRPr lang="en-US" sz="1600" dirty="0">
               <a:solidFill>
                 <a:schemeClr val="tx1"/>
               </a:solidFill>
-              <a:latin typeface="Times New Roman" panose="02020603050405020304" pitchFamily="18" charset="0"/>
+              <a:latin typeface="宋体" panose="02010600030101010101" pitchFamily="2" charset="-122"/>
               <a:ea typeface="宋体" panose="02010600030101010101" pitchFamily="2" charset="-122"/>
             </a:endParaRPr>
           </a:p>
@@ -3461,8 +3316,8 @@
         </p:nvSpPr>
         <p:spPr>
           <a:xfrm>
-            <a:off x="2200942" y="6597941"/>
-            <a:ext cx="2355614" cy="723097"/>
+            <a:off x="922739" y="6849203"/>
+            <a:ext cx="4902921" cy="1242819"/>
           </a:xfrm>
           <a:prstGeom prst="rect">
             <a:avLst/>
@@ -3496,49 +3351,29 @@
           <a:p>
             <a:pPr algn="ctr"/>
             <a:r>
-              <a:rPr lang="zh-CN" altLang="en-US" dirty="0">
+              <a:rPr lang="en-US" altLang="zh-CN" sz="1600" dirty="0">
                 <a:solidFill>
                   <a:schemeClr val="tx1"/>
                 </a:solidFill>
-                <a:latin typeface="Times New Roman" panose="02020603050405020304" pitchFamily="18" charset="0"/>
+                <a:latin typeface="宋体" panose="02010600030101010101" pitchFamily="2" charset="-122"/>
                 <a:ea typeface="宋体" panose="02010600030101010101" pitchFamily="2" charset="-122"/>
               </a:rPr>
-              <a:t>第四章</a:t>
-            </a:r>
-            <a:r>
-              <a:rPr lang="en-US" altLang="zh-CN" dirty="0">
+              <a:t/>
+            </a:r>
+            <a:br>
+              <a:rPr lang="en-US" altLang="zh-CN" sz="1600" dirty="0">
                 <a:solidFill>
                   <a:schemeClr val="tx1"/>
                 </a:solidFill>
-                <a:latin typeface="Times New Roman" panose="02020603050405020304" pitchFamily="18" charset="0"/>
-                <a:ea typeface="宋体" panose="02010600030101010101" pitchFamily="2" charset="-122"/>
-              </a:rPr>
-              <a:t/>
-            </a:r>
-            <a:br>
-              <a:rPr lang="en-US" altLang="zh-CN" dirty="0">
-                <a:solidFill>
-                  <a:schemeClr val="tx1"/>
-                </a:solidFill>
-                <a:latin typeface="Times New Roman" panose="02020603050405020304" pitchFamily="18" charset="0"/>
+                <a:latin typeface="宋体" panose="02010600030101010101" pitchFamily="2" charset="-122"/>
                 <a:ea typeface="宋体" panose="02010600030101010101" pitchFamily="2" charset="-122"/>
               </a:rPr>
             </a:br>
-            <a:r>
-              <a:rPr lang="zh-CN" altLang="en-US" dirty="0">
-                <a:solidFill>
-                  <a:schemeClr val="tx1"/>
-                </a:solidFill>
-                <a:latin typeface="Times New Roman" panose="02020603050405020304" pitchFamily="18" charset="0"/>
-                <a:ea typeface="宋体" panose="02010600030101010101" pitchFamily="2" charset="-122"/>
-              </a:rPr>
-              <a:t>本研究的实验设计</a:t>
-            </a:r>
-            <a:endParaRPr lang="en-US" dirty="0">
+            <a:endParaRPr lang="en-US" sz="1600" dirty="0">
               <a:solidFill>
                 <a:schemeClr val="tx1"/>
               </a:solidFill>
-              <a:latin typeface="Times New Roman" panose="02020603050405020304" pitchFamily="18" charset="0"/>
+              <a:latin typeface="宋体" panose="02010600030101010101" pitchFamily="2" charset="-122"/>
               <a:ea typeface="宋体" panose="02010600030101010101" pitchFamily="2" charset="-122"/>
             </a:endParaRPr>
           </a:p>
@@ -3552,7 +3387,7 @@
         </p:nvSpPr>
         <p:spPr>
           <a:xfrm>
-            <a:off x="2007902" y="8105707"/>
+            <a:off x="2003351" y="8539825"/>
             <a:ext cx="2741696" cy="864790"/>
           </a:xfrm>
           <a:prstGeom prst="rect">
@@ -3587,41 +3422,51 @@
           <a:p>
             <a:pPr algn="ctr"/>
             <a:r>
-              <a:rPr lang="zh-CN" altLang="en-US" dirty="0">
+              <a:rPr lang="zh-CN" altLang="en-US" sz="1600" dirty="0">
                 <a:solidFill>
                   <a:schemeClr val="tx1"/>
                 </a:solidFill>
-                <a:latin typeface="Times New Roman" panose="02020603050405020304" pitchFamily="18" charset="0"/>
-                <a:ea typeface="宋体" panose="02010600030101010101" pitchFamily="2" charset="-122"/>
+                <a:latin typeface="黑体" panose="02010609060101010101" pitchFamily="49" charset="-122"/>
+                <a:ea typeface="黑体" panose="02010609060101010101" pitchFamily="49" charset="-122"/>
               </a:rPr>
               <a:t>第五章</a:t>
             </a:r>
-            <a:endParaRPr lang="en-US" altLang="zh-CN" dirty="0">
+            <a:endParaRPr lang="en-US" altLang="zh-CN" sz="1600" dirty="0">
               <a:solidFill>
                 <a:schemeClr val="tx1"/>
               </a:solidFill>
-              <a:latin typeface="Times New Roman" panose="02020603050405020304" pitchFamily="18" charset="0"/>
-              <a:ea typeface="宋体" panose="02010600030101010101" pitchFamily="2" charset="-122"/>
+              <a:latin typeface="黑体" panose="02010609060101010101" pitchFamily="49" charset="-122"/>
+              <a:ea typeface="黑体" panose="02010609060101010101" pitchFamily="49" charset="-122"/>
             </a:endParaRPr>
           </a:p>
           <a:p>
             <a:pPr algn="ctr"/>
             <a:r>
-              <a:rPr lang="zh-CN" altLang="en-US" dirty="0">
+              <a:rPr lang="zh-CN" altLang="en-US" sz="1600" dirty="0" smtClean="0">
                 <a:solidFill>
                   <a:schemeClr val="tx1"/>
                 </a:solidFill>
-                <a:latin typeface="Times New Roman" panose="02020603050405020304" pitchFamily="18" charset="0"/>
-                <a:ea typeface="宋体" panose="02010600030101010101" pitchFamily="2" charset="-122"/>
+                <a:latin typeface="黑体" panose="02010609060101010101" pitchFamily="49" charset="-122"/>
+                <a:ea typeface="黑体" panose="02010609060101010101" pitchFamily="49" charset="-122"/>
               </a:rPr>
-              <a:t>实验结果、结论、展望</a:t>
-            </a:r>
-            <a:endParaRPr lang="en-US" altLang="zh-CN" dirty="0">
+              <a:t>结论</a:t>
+            </a:r>
+            <a:r>
+              <a:rPr lang="zh-CN" altLang="en-US" sz="1600" dirty="0">
+                <a:solidFill>
+                  <a:schemeClr val="tx1"/>
+                </a:solidFill>
+                <a:latin typeface="黑体" panose="02010609060101010101" pitchFamily="49" charset="-122"/>
+                <a:ea typeface="黑体" panose="02010609060101010101" pitchFamily="49" charset="-122"/>
+              </a:rPr>
+              <a:t>、展望</a:t>
+            </a:r>
+            <a:endParaRPr lang="en-US" altLang="zh-CN" sz="1600" dirty="0">
               <a:solidFill>
                 <a:schemeClr val="tx1"/>
               </a:solidFill>
-              <a:latin typeface="Times New Roman" panose="02020603050405020304" pitchFamily="18" charset="0"/>
-              <a:ea typeface="宋体" panose="02010600030101010101" pitchFamily="2" charset="-122"/>
+              <a:latin typeface="黑体" panose="02010609060101010101" pitchFamily="49" charset="-122"/>
+              <a:ea typeface="黑体" panose="02010609060101010101" pitchFamily="49" charset="-122"/>
             </a:endParaRPr>
           </a:p>
         </p:txBody>
@@ -3637,8 +3482,8 @@
         </p:nvCxnSpPr>
         <p:spPr>
           <a:xfrm flipH="1">
-            <a:off x="3378753" y="1545491"/>
-            <a:ext cx="3" cy="802209"/>
+            <a:off x="3378748" y="1381368"/>
+            <a:ext cx="8" cy="623278"/>
           </a:xfrm>
           <a:prstGeom prst="straightConnector1">
             <a:avLst/>
@@ -3675,9 +3520,9 @@
           <p:nvPr/>
         </p:nvCxnSpPr>
         <p:spPr>
-          <a:xfrm>
-            <a:off x="3378754" y="4086069"/>
-            <a:ext cx="3989" cy="974567"/>
+          <a:xfrm flipH="1">
+            <a:off x="3374201" y="4431752"/>
+            <a:ext cx="4547" cy="435649"/>
           </a:xfrm>
           <a:prstGeom prst="straightConnector1">
             <a:avLst/>
@@ -3715,8 +3560,8 @@
         </p:nvCxnSpPr>
         <p:spPr>
           <a:xfrm flipH="1">
-            <a:off x="3378749" y="5740664"/>
-            <a:ext cx="3990" cy="857277"/>
+            <a:off x="3374200" y="6413554"/>
+            <a:ext cx="1" cy="435649"/>
           </a:xfrm>
           <a:prstGeom prst="straightConnector1">
             <a:avLst/>
@@ -3753,9 +3598,9 @@
           <p:nvPr/>
         </p:nvCxnSpPr>
         <p:spPr>
-          <a:xfrm>
-            <a:off x="3378753" y="7321037"/>
-            <a:ext cx="1" cy="784673"/>
+          <a:xfrm flipH="1">
+            <a:off x="3374199" y="8092022"/>
+            <a:ext cx="1" cy="447803"/>
           </a:xfrm>
           <a:prstGeom prst="straightConnector1">
             <a:avLst/>
@@ -3782,6 +3627,699 @@
           </a:fontRef>
         </p:style>
       </p:cxnSp>
+      <p:sp>
+        <p:nvSpPr>
+          <p:cNvPr id="7" name="文本框 6"/>
+          <p:cNvSpPr txBox="1"/>
+          <p:nvPr/>
+        </p:nvSpPr>
+        <p:spPr>
+          <a:xfrm>
+            <a:off x="2272516" y="2145927"/>
+            <a:ext cx="2212465" cy="584775"/>
+          </a:xfrm>
+          <a:prstGeom prst="rect">
+            <a:avLst/>
+          </a:prstGeom>
+          <a:noFill/>
+        </p:spPr>
+        <p:txBody>
+          <a:bodyPr wrap="none" rtlCol="0">
+            <a:spAutoFit/>
+          </a:bodyPr>
+          <a:lstStyle/>
+          <a:p>
+            <a:pPr algn="ctr"/>
+            <a:r>
+              <a:rPr lang="zh-CN" altLang="en-US" sz="1600" dirty="0" smtClean="0">
+                <a:latin typeface="黑体" panose="02010609060101010101" pitchFamily="49" charset="-122"/>
+                <a:ea typeface="黑体" panose="02010609060101010101" pitchFamily="49" charset="-122"/>
+              </a:rPr>
+              <a:t>第二章</a:t>
+            </a:r>
+            <a:r>
+              <a:rPr lang="en-US" altLang="zh-CN" sz="1600" dirty="0" smtClean="0">
+                <a:latin typeface="黑体" panose="02010609060101010101" pitchFamily="49" charset="-122"/>
+                <a:ea typeface="黑体" panose="02010609060101010101" pitchFamily="49" charset="-122"/>
+              </a:rPr>
+              <a:t> </a:t>
+            </a:r>
+            <a:r>
+              <a:rPr lang="zh-CN" altLang="en-US" sz="1600" dirty="0" smtClean="0">
+                <a:latin typeface="黑体" panose="02010609060101010101" pitchFamily="49" charset="-122"/>
+                <a:ea typeface="黑体" panose="02010609060101010101" pitchFamily="49" charset="-122"/>
+              </a:rPr>
+              <a:t>分析现有</a:t>
+            </a:r>
+            <a:r>
+              <a:rPr lang="zh-CN" altLang="en-US" sz="1600" dirty="0">
+                <a:latin typeface="黑体" panose="02010609060101010101" pitchFamily="49" charset="-122"/>
+                <a:ea typeface="黑体" panose="02010609060101010101" pitchFamily="49" charset="-122"/>
+              </a:rPr>
+              <a:t>算法</a:t>
+            </a:r>
+            <a:endParaRPr lang="en-US" altLang="zh-CN" sz="1600" dirty="0">
+              <a:latin typeface="黑体" panose="02010609060101010101" pitchFamily="49" charset="-122"/>
+              <a:ea typeface="黑体" panose="02010609060101010101" pitchFamily="49" charset="-122"/>
+            </a:endParaRPr>
+          </a:p>
+          <a:p>
+            <a:endParaRPr lang="en-US" sz="1600" dirty="0">
+              <a:latin typeface="宋体" panose="02010600030101010101" pitchFamily="2" charset="-122"/>
+              <a:ea typeface="宋体" panose="02010600030101010101" pitchFamily="2" charset="-122"/>
+            </a:endParaRPr>
+          </a:p>
+        </p:txBody>
+      </p:sp>
+      <p:sp>
+        <p:nvSpPr>
+          <p:cNvPr id="8" name="文本框 7"/>
+          <p:cNvSpPr txBox="1"/>
+          <p:nvPr/>
+        </p:nvSpPr>
+        <p:spPr>
+          <a:xfrm>
+            <a:off x="1506477" y="2684043"/>
+            <a:ext cx="1415772" cy="584775"/>
+          </a:xfrm>
+          <a:prstGeom prst="rect">
+            <a:avLst/>
+          </a:prstGeom>
+          <a:noFill/>
+        </p:spPr>
+        <p:txBody>
+          <a:bodyPr wrap="none" rtlCol="0">
+            <a:spAutoFit/>
+          </a:bodyPr>
+          <a:lstStyle/>
+          <a:p>
+            <a:pPr algn="ctr"/>
+            <a:r>
+              <a:rPr lang="zh-CN" altLang="en-US" sz="1600" dirty="0">
+                <a:latin typeface="仿宋" panose="02010609060101010101" pitchFamily="49" charset="-122"/>
+                <a:ea typeface="仿宋" panose="02010609060101010101" pitchFamily="49" charset="-122"/>
+              </a:rPr>
+              <a:t>主要方法</a:t>
+            </a:r>
+            <a:r>
+              <a:rPr lang="en-US" altLang="zh-CN" sz="1600" dirty="0">
+                <a:latin typeface="仿宋" panose="02010609060101010101" pitchFamily="49" charset="-122"/>
+                <a:ea typeface="仿宋" panose="02010609060101010101" pitchFamily="49" charset="-122"/>
+              </a:rPr>
+              <a:t/>
+            </a:r>
+            <a:br>
+              <a:rPr lang="en-US" altLang="zh-CN" sz="1600" dirty="0">
+                <a:latin typeface="仿宋" panose="02010609060101010101" pitchFamily="49" charset="-122"/>
+                <a:ea typeface="仿宋" panose="02010609060101010101" pitchFamily="49" charset="-122"/>
+              </a:rPr>
+            </a:br>
+            <a:r>
+              <a:rPr lang="zh-CN" altLang="en-US" sz="1600" dirty="0">
+                <a:latin typeface="仿宋" panose="02010609060101010101" pitchFamily="49" charset="-122"/>
+                <a:ea typeface="仿宋" panose="02010609060101010101" pitchFamily="49" charset="-122"/>
+              </a:rPr>
+              <a:t>深度</a:t>
+            </a:r>
+            <a:r>
+              <a:rPr lang="zh-CN" altLang="en-US" sz="1600" dirty="0" smtClean="0">
+                <a:latin typeface="仿宋" panose="02010609060101010101" pitchFamily="49" charset="-122"/>
+                <a:ea typeface="仿宋" panose="02010609060101010101" pitchFamily="49" charset="-122"/>
+              </a:rPr>
+              <a:t>神经网络</a:t>
+            </a:r>
+            <a:endParaRPr lang="en-US" sz="1600" dirty="0">
+              <a:latin typeface="仿宋" panose="02010609060101010101" pitchFamily="49" charset="-122"/>
+              <a:ea typeface="仿宋" panose="02010609060101010101" pitchFamily="49" charset="-122"/>
+            </a:endParaRPr>
+          </a:p>
+        </p:txBody>
+      </p:sp>
+      <p:sp>
+        <p:nvSpPr>
+          <p:cNvPr id="9" name="文本框 8"/>
+          <p:cNvSpPr txBox="1"/>
+          <p:nvPr/>
+        </p:nvSpPr>
+        <p:spPr>
+          <a:xfrm>
+            <a:off x="1498800" y="3323891"/>
+            <a:ext cx="1396536" cy="830997"/>
+          </a:xfrm>
+          <a:prstGeom prst="rect">
+            <a:avLst/>
+          </a:prstGeom>
+          <a:noFill/>
+        </p:spPr>
+        <p:txBody>
+          <a:bodyPr wrap="none" rtlCol="0">
+            <a:spAutoFit/>
+          </a:bodyPr>
+          <a:lstStyle/>
+          <a:p>
+            <a:pPr marL="285750" indent="-285750">
+              <a:buFontTx/>
+              <a:buChar char="-"/>
+            </a:pPr>
+            <a:r>
+              <a:rPr lang="en-US" sz="1600" dirty="0" smtClean="0">
+                <a:latin typeface="仿宋" panose="02010609060101010101" pitchFamily="49" charset="-122"/>
+                <a:ea typeface="仿宋" panose="02010609060101010101" pitchFamily="49" charset="-122"/>
+              </a:rPr>
+              <a:t>CNN</a:t>
+            </a:r>
+          </a:p>
+          <a:p>
+            <a:pPr marL="285750" indent="-285750">
+              <a:buFontTx/>
+              <a:buChar char="-"/>
+            </a:pPr>
+            <a:r>
+              <a:rPr lang="en-US" sz="1600" dirty="0" smtClean="0">
+                <a:latin typeface="仿宋" panose="02010609060101010101" pitchFamily="49" charset="-122"/>
+                <a:ea typeface="仿宋" panose="02010609060101010101" pitchFamily="49" charset="-122"/>
+              </a:rPr>
+              <a:t>RNN</a:t>
+            </a:r>
+          </a:p>
+          <a:p>
+            <a:pPr marL="285750" indent="-285750">
+              <a:buFontTx/>
+              <a:buChar char="-"/>
+            </a:pPr>
+            <a:r>
+              <a:rPr lang="zh-CN" altLang="en-US" sz="1600" dirty="0" smtClean="0">
+                <a:latin typeface="仿宋" panose="02010609060101010101" pitchFamily="49" charset="-122"/>
+                <a:ea typeface="仿宋" panose="02010609060101010101" pitchFamily="49" charset="-122"/>
+              </a:rPr>
+              <a:t>编码</a:t>
+            </a:r>
+            <a:r>
+              <a:rPr lang="en-US" altLang="zh-CN" sz="1600" dirty="0" smtClean="0">
+                <a:latin typeface="仿宋" panose="02010609060101010101" pitchFamily="49" charset="-122"/>
+                <a:ea typeface="仿宋" panose="02010609060101010101" pitchFamily="49" charset="-122"/>
+              </a:rPr>
+              <a:t>-</a:t>
+            </a:r>
+            <a:r>
+              <a:rPr lang="zh-CN" altLang="en-US" sz="1600" dirty="0" smtClean="0">
+                <a:latin typeface="仿宋" panose="02010609060101010101" pitchFamily="49" charset="-122"/>
+                <a:ea typeface="仿宋" panose="02010609060101010101" pitchFamily="49" charset="-122"/>
+              </a:rPr>
+              <a:t>解码</a:t>
+            </a:r>
+            <a:endParaRPr lang="en-US" sz="1600" dirty="0">
+              <a:latin typeface="仿宋" panose="02010609060101010101" pitchFamily="49" charset="-122"/>
+              <a:ea typeface="仿宋" panose="02010609060101010101" pitchFamily="49" charset="-122"/>
+            </a:endParaRPr>
+          </a:p>
+        </p:txBody>
+      </p:sp>
+      <p:sp>
+        <p:nvSpPr>
+          <p:cNvPr id="10" name="文本框 9"/>
+          <p:cNvSpPr txBox="1"/>
+          <p:nvPr/>
+        </p:nvSpPr>
+        <p:spPr>
+          <a:xfrm>
+            <a:off x="3378748" y="2663318"/>
+            <a:ext cx="2031325" cy="584775"/>
+          </a:xfrm>
+          <a:prstGeom prst="rect">
+            <a:avLst/>
+          </a:prstGeom>
+          <a:noFill/>
+        </p:spPr>
+        <p:txBody>
+          <a:bodyPr wrap="none" rtlCol="0">
+            <a:spAutoFit/>
+          </a:bodyPr>
+          <a:lstStyle/>
+          <a:p>
+            <a:pPr algn="ctr"/>
+            <a:r>
+              <a:rPr lang="zh-CN" altLang="en-US" sz="1600" dirty="0">
+                <a:latin typeface="仿宋" panose="02010609060101010101" pitchFamily="49" charset="-122"/>
+                <a:ea typeface="仿宋" panose="02010609060101010101" pitchFamily="49" charset="-122"/>
+              </a:rPr>
+              <a:t>主要研究问题</a:t>
+            </a:r>
+            <a:r>
+              <a:rPr lang="en-US" altLang="zh-CN" sz="1600" dirty="0">
+                <a:latin typeface="仿宋" panose="02010609060101010101" pitchFamily="49" charset="-122"/>
+                <a:ea typeface="仿宋" panose="02010609060101010101" pitchFamily="49" charset="-122"/>
+              </a:rPr>
+              <a:t/>
+            </a:r>
+            <a:br>
+              <a:rPr lang="en-US" altLang="zh-CN" sz="1600" dirty="0">
+                <a:latin typeface="仿宋" panose="02010609060101010101" pitchFamily="49" charset="-122"/>
+                <a:ea typeface="仿宋" panose="02010609060101010101" pitchFamily="49" charset="-122"/>
+              </a:rPr>
+            </a:br>
+            <a:r>
+              <a:rPr lang="zh-CN" altLang="en-US" sz="1600" dirty="0">
+                <a:latin typeface="仿宋" panose="02010609060101010101" pitchFamily="49" charset="-122"/>
+                <a:ea typeface="仿宋" panose="02010609060101010101" pitchFamily="49" charset="-122"/>
+              </a:rPr>
+              <a:t>像素级目标</a:t>
+            </a:r>
+            <a:r>
+              <a:rPr lang="zh-CN" altLang="en-US" sz="1600" dirty="0" smtClean="0">
+                <a:latin typeface="仿宋" panose="02010609060101010101" pitchFamily="49" charset="-122"/>
+                <a:ea typeface="仿宋" panose="02010609060101010101" pitchFamily="49" charset="-122"/>
+              </a:rPr>
+              <a:t>跟踪算法</a:t>
+            </a:r>
+            <a:endParaRPr lang="en-US" sz="1600" dirty="0">
+              <a:latin typeface="仿宋" panose="02010609060101010101" pitchFamily="49" charset="-122"/>
+              <a:ea typeface="仿宋" panose="02010609060101010101" pitchFamily="49" charset="-122"/>
+            </a:endParaRPr>
+          </a:p>
+        </p:txBody>
+      </p:sp>
+      <p:sp>
+        <p:nvSpPr>
+          <p:cNvPr id="22" name="文本框 21"/>
+          <p:cNvSpPr txBox="1"/>
+          <p:nvPr/>
+        </p:nvSpPr>
+        <p:spPr>
+          <a:xfrm>
+            <a:off x="3464145" y="3471572"/>
+            <a:ext cx="1909497" cy="584775"/>
+          </a:xfrm>
+          <a:prstGeom prst="rect">
+            <a:avLst/>
+          </a:prstGeom>
+          <a:noFill/>
+        </p:spPr>
+        <p:txBody>
+          <a:bodyPr wrap="none" rtlCol="0">
+            <a:spAutoFit/>
+          </a:bodyPr>
+          <a:lstStyle/>
+          <a:p>
+            <a:pPr marL="285750" indent="-285750">
+              <a:buFontTx/>
+              <a:buChar char="-"/>
+            </a:pPr>
+            <a:r>
+              <a:rPr lang="zh-CN" altLang="en-US" sz="1600" dirty="0" smtClean="0">
+                <a:latin typeface="仿宋" panose="02010609060101010101" pitchFamily="49" charset="-122"/>
+                <a:ea typeface="仿宋" panose="02010609060101010101" pitchFamily="49" charset="-122"/>
+              </a:rPr>
+              <a:t>缺乏多尺度思想</a:t>
+            </a:r>
+            <a:endParaRPr lang="en-US" altLang="zh-CN" sz="1600" dirty="0" smtClean="0">
+              <a:latin typeface="仿宋" panose="02010609060101010101" pitchFamily="49" charset="-122"/>
+              <a:ea typeface="仿宋" panose="02010609060101010101" pitchFamily="49" charset="-122"/>
+            </a:endParaRPr>
+          </a:p>
+          <a:p>
+            <a:pPr marL="285750" indent="-285750">
+              <a:buFontTx/>
+              <a:buChar char="-"/>
+            </a:pPr>
+            <a:r>
+              <a:rPr lang="zh-CN" altLang="en-US" sz="1600" dirty="0" smtClean="0">
+                <a:latin typeface="仿宋" panose="02010609060101010101" pitchFamily="49" charset="-122"/>
+                <a:ea typeface="仿宋" panose="02010609060101010101" pitchFamily="49" charset="-122"/>
+              </a:rPr>
+              <a:t>结构复杂</a:t>
+            </a:r>
+            <a:endParaRPr lang="en-US" sz="1600" dirty="0">
+              <a:latin typeface="仿宋" panose="02010609060101010101" pitchFamily="49" charset="-122"/>
+              <a:ea typeface="仿宋" panose="02010609060101010101" pitchFamily="49" charset="-122"/>
+            </a:endParaRPr>
+          </a:p>
+        </p:txBody>
+      </p:sp>
+      <p:sp>
+        <p:nvSpPr>
+          <p:cNvPr id="30" name="文本框 29"/>
+          <p:cNvSpPr txBox="1"/>
+          <p:nvPr/>
+        </p:nvSpPr>
+        <p:spPr>
+          <a:xfrm>
+            <a:off x="2115122" y="5016817"/>
+            <a:ext cx="2339102" cy="338554"/>
+          </a:xfrm>
+          <a:prstGeom prst="rect">
+            <a:avLst/>
+          </a:prstGeom>
+          <a:noFill/>
+        </p:spPr>
+        <p:txBody>
+          <a:bodyPr wrap="none" rtlCol="0">
+            <a:spAutoFit/>
+          </a:bodyPr>
+          <a:lstStyle/>
+          <a:p>
+            <a:r>
+              <a:rPr lang="zh-CN" altLang="en-US" sz="1600" dirty="0">
+                <a:latin typeface="黑体" panose="02010609060101010101" pitchFamily="49" charset="-122"/>
+                <a:ea typeface="黑体" panose="02010609060101010101" pitchFamily="49" charset="-122"/>
+              </a:rPr>
+              <a:t>第三章</a:t>
+            </a:r>
+            <a:r>
+              <a:rPr lang="en-US" altLang="zh-CN" sz="1600" dirty="0">
+                <a:latin typeface="黑体" panose="02010609060101010101" pitchFamily="49" charset="-122"/>
+                <a:ea typeface="黑体" panose="02010609060101010101" pitchFamily="49" charset="-122"/>
+              </a:rPr>
+              <a:t> </a:t>
+            </a:r>
+            <a:r>
+              <a:rPr lang="zh-CN" altLang="en-US" sz="1600" dirty="0">
+                <a:latin typeface="黑体" panose="02010609060101010101" pitchFamily="49" charset="-122"/>
+                <a:ea typeface="黑体" panose="02010609060101010101" pitchFamily="49" charset="-122"/>
+              </a:rPr>
+              <a:t>论文的理论</a:t>
+            </a:r>
+            <a:r>
+              <a:rPr lang="zh-CN" altLang="en-US" sz="1600" dirty="0" smtClean="0">
+                <a:latin typeface="黑体" panose="02010609060101010101" pitchFamily="49" charset="-122"/>
+                <a:ea typeface="黑体" panose="02010609060101010101" pitchFamily="49" charset="-122"/>
+              </a:rPr>
+              <a:t>创新</a:t>
+            </a:r>
+            <a:endParaRPr lang="en-US" sz="1600" dirty="0">
+              <a:latin typeface="黑体" panose="02010609060101010101" pitchFamily="49" charset="-122"/>
+              <a:ea typeface="黑体" panose="02010609060101010101" pitchFamily="49" charset="-122"/>
+            </a:endParaRPr>
+          </a:p>
+        </p:txBody>
+      </p:sp>
+      <p:sp>
+        <p:nvSpPr>
+          <p:cNvPr id="33" name="文本框 32"/>
+          <p:cNvSpPr txBox="1"/>
+          <p:nvPr/>
+        </p:nvSpPr>
+        <p:spPr>
+          <a:xfrm>
+            <a:off x="946893" y="5344760"/>
+            <a:ext cx="5062604" cy="338554"/>
+          </a:xfrm>
+          <a:prstGeom prst="rect">
+            <a:avLst/>
+          </a:prstGeom>
+          <a:noFill/>
+        </p:spPr>
+        <p:txBody>
+          <a:bodyPr wrap="none" rtlCol="0">
+            <a:spAutoFit/>
+          </a:bodyPr>
+          <a:lstStyle/>
+          <a:p>
+            <a:r>
+              <a:rPr lang="zh-CN" altLang="en-US" sz="1600" dirty="0" smtClean="0">
+                <a:latin typeface="仿宋" panose="02010609060101010101" pitchFamily="49" charset="-122"/>
+                <a:ea typeface="仿宋" panose="02010609060101010101" pitchFamily="49" charset="-122"/>
+              </a:rPr>
+              <a:t>将</a:t>
+            </a:r>
+            <a:r>
+              <a:rPr lang="en-US" altLang="zh-CN" sz="1600" dirty="0" smtClean="0">
+                <a:latin typeface="仿宋" panose="02010609060101010101" pitchFamily="49" charset="-122"/>
+                <a:ea typeface="仿宋" panose="02010609060101010101" pitchFamily="49" charset="-122"/>
+              </a:rPr>
+              <a:t>RNN</a:t>
+            </a:r>
+            <a:r>
+              <a:rPr lang="zh-CN" altLang="en-US" sz="1600" dirty="0" smtClean="0">
+                <a:latin typeface="仿宋" panose="02010609060101010101" pitchFamily="49" charset="-122"/>
+                <a:ea typeface="仿宋" panose="02010609060101010101" pitchFamily="49" charset="-122"/>
+              </a:rPr>
+              <a:t>插入编码</a:t>
+            </a:r>
+            <a:r>
+              <a:rPr lang="en-US" altLang="zh-CN" sz="1600" dirty="0" smtClean="0">
+                <a:latin typeface="仿宋" panose="02010609060101010101" pitchFamily="49" charset="-122"/>
+                <a:ea typeface="仿宋" panose="02010609060101010101" pitchFamily="49" charset="-122"/>
+              </a:rPr>
+              <a:t>-</a:t>
+            </a:r>
+            <a:r>
+              <a:rPr lang="zh-CN" altLang="en-US" sz="1600" dirty="0" smtClean="0">
+                <a:latin typeface="仿宋" panose="02010609060101010101" pitchFamily="49" charset="-122"/>
+                <a:ea typeface="仿宋" panose="02010609060101010101" pitchFamily="49" charset="-122"/>
+              </a:rPr>
+              <a:t>解码结构的像素级视频目标跟踪算法</a:t>
+            </a:r>
+            <a:endParaRPr lang="en-US" sz="1600" dirty="0">
+              <a:latin typeface="仿宋" panose="02010609060101010101" pitchFamily="49" charset="-122"/>
+              <a:ea typeface="仿宋" panose="02010609060101010101" pitchFamily="49" charset="-122"/>
+            </a:endParaRPr>
+          </a:p>
+        </p:txBody>
+      </p:sp>
+      <p:sp>
+        <p:nvSpPr>
+          <p:cNvPr id="34" name="矩形 33"/>
+          <p:cNvSpPr/>
+          <p:nvPr/>
+        </p:nvSpPr>
+        <p:spPr>
+          <a:xfrm>
+            <a:off x="1218226" y="5731050"/>
+            <a:ext cx="2007697" cy="584192"/>
+          </a:xfrm>
+          <a:prstGeom prst="rect">
+            <a:avLst/>
+          </a:prstGeom>
+          <a:noFill/>
+          <a:ln w="15875">
+            <a:solidFill>
+              <a:schemeClr val="tx1"/>
+            </a:solidFill>
+            <a:prstDash val="sysDash"/>
+          </a:ln>
+        </p:spPr>
+        <p:style>
+          <a:lnRef idx="2">
+            <a:schemeClr val="accent1">
+              <a:shade val="50000"/>
+            </a:schemeClr>
+          </a:lnRef>
+          <a:fillRef idx="1">
+            <a:schemeClr val="accent1"/>
+          </a:fillRef>
+          <a:effectRef idx="0">
+            <a:schemeClr val="accent1"/>
+          </a:effectRef>
+          <a:fontRef idx="minor">
+            <a:schemeClr val="lt1"/>
+          </a:fontRef>
+        </p:style>
+        <p:txBody>
+          <a:bodyPr rtlCol="0" anchor="ctr"/>
+          <a:lstStyle/>
+          <a:p>
+            <a:pPr algn="ctr"/>
+            <a:r>
+              <a:rPr lang="zh-CN" altLang="en-US" sz="1600" dirty="0" smtClean="0">
+                <a:solidFill>
+                  <a:schemeClr val="tx1"/>
+                </a:solidFill>
+                <a:latin typeface="宋体" panose="02010600030101010101" pitchFamily="2" charset="-122"/>
+                <a:ea typeface="宋体" panose="02010600030101010101" pitchFamily="2" charset="-122"/>
+              </a:rPr>
+              <a:t>空间维度处理</a:t>
+            </a:r>
+            <a:endParaRPr lang="en-US" sz="1600" dirty="0">
+              <a:solidFill>
+                <a:schemeClr val="tx1"/>
+              </a:solidFill>
+              <a:latin typeface="宋体" panose="02010600030101010101" pitchFamily="2" charset="-122"/>
+              <a:ea typeface="宋体" panose="02010600030101010101" pitchFamily="2" charset="-122"/>
+            </a:endParaRPr>
+          </a:p>
+        </p:txBody>
+      </p:sp>
+      <p:sp>
+        <p:nvSpPr>
+          <p:cNvPr id="36" name="矩形 35"/>
+          <p:cNvSpPr/>
+          <p:nvPr/>
+        </p:nvSpPr>
+        <p:spPr>
+          <a:xfrm>
+            <a:off x="3452508" y="5743142"/>
+            <a:ext cx="2007697" cy="584192"/>
+          </a:xfrm>
+          <a:prstGeom prst="rect">
+            <a:avLst/>
+          </a:prstGeom>
+          <a:noFill/>
+          <a:ln w="15875">
+            <a:solidFill>
+              <a:schemeClr val="tx1"/>
+            </a:solidFill>
+            <a:prstDash val="sysDash"/>
+          </a:ln>
+        </p:spPr>
+        <p:style>
+          <a:lnRef idx="2">
+            <a:schemeClr val="accent1">
+              <a:shade val="50000"/>
+            </a:schemeClr>
+          </a:lnRef>
+          <a:fillRef idx="1">
+            <a:schemeClr val="accent1"/>
+          </a:fillRef>
+          <a:effectRef idx="0">
+            <a:schemeClr val="accent1"/>
+          </a:effectRef>
+          <a:fontRef idx="minor">
+            <a:schemeClr val="lt1"/>
+          </a:fontRef>
+        </p:style>
+        <p:txBody>
+          <a:bodyPr rtlCol="0" anchor="ctr"/>
+          <a:lstStyle/>
+          <a:p>
+            <a:pPr algn="ctr"/>
+            <a:r>
+              <a:rPr lang="zh-CN" altLang="en-US" sz="1600" dirty="0" smtClean="0">
+                <a:solidFill>
+                  <a:schemeClr val="tx1"/>
+                </a:solidFill>
+                <a:latin typeface="宋体" panose="02010600030101010101" pitchFamily="2" charset="-122"/>
+                <a:ea typeface="宋体" panose="02010600030101010101" pitchFamily="2" charset="-122"/>
+              </a:rPr>
+              <a:t>时间维度处理</a:t>
+            </a:r>
+            <a:endParaRPr lang="en-US" sz="1600" dirty="0">
+              <a:solidFill>
+                <a:schemeClr val="tx1"/>
+              </a:solidFill>
+              <a:latin typeface="宋体" panose="02010600030101010101" pitchFamily="2" charset="-122"/>
+              <a:ea typeface="宋体" panose="02010600030101010101" pitchFamily="2" charset="-122"/>
+            </a:endParaRPr>
+          </a:p>
+        </p:txBody>
+      </p:sp>
+      <p:sp>
+        <p:nvSpPr>
+          <p:cNvPr id="52" name="文本框 51"/>
+          <p:cNvSpPr txBox="1"/>
+          <p:nvPr/>
+        </p:nvSpPr>
+        <p:spPr>
+          <a:xfrm>
+            <a:off x="2334231" y="6849204"/>
+            <a:ext cx="1928733" cy="338554"/>
+          </a:xfrm>
+          <a:prstGeom prst="rect">
+            <a:avLst/>
+          </a:prstGeom>
+          <a:noFill/>
+        </p:spPr>
+        <p:txBody>
+          <a:bodyPr wrap="none" rtlCol="0">
+            <a:spAutoFit/>
+          </a:bodyPr>
+          <a:lstStyle/>
+          <a:p>
+            <a:r>
+              <a:rPr lang="zh-CN" altLang="en-US" sz="1600" dirty="0">
+                <a:latin typeface="黑体" panose="02010609060101010101" pitchFamily="49" charset="-122"/>
+                <a:ea typeface="黑体" panose="02010609060101010101" pitchFamily="49" charset="-122"/>
+              </a:rPr>
+              <a:t>第四章 </a:t>
+            </a:r>
+            <a:r>
+              <a:rPr lang="zh-CN" altLang="en-US" sz="1600" dirty="0" smtClean="0">
+                <a:latin typeface="黑体" panose="02010609060101010101" pitchFamily="49" charset="-122"/>
+                <a:ea typeface="黑体" panose="02010609060101010101" pitchFamily="49" charset="-122"/>
+              </a:rPr>
+              <a:t>实验与结果</a:t>
+            </a:r>
+            <a:endParaRPr lang="en-US" sz="1600" dirty="0">
+              <a:latin typeface="黑体" panose="02010609060101010101" pitchFamily="49" charset="-122"/>
+              <a:ea typeface="黑体" panose="02010609060101010101" pitchFamily="49" charset="-122"/>
+            </a:endParaRPr>
+          </a:p>
+        </p:txBody>
+      </p:sp>
+      <p:sp>
+        <p:nvSpPr>
+          <p:cNvPr id="55" name="文本框 54"/>
+          <p:cNvSpPr txBox="1"/>
+          <p:nvPr/>
+        </p:nvSpPr>
+        <p:spPr>
+          <a:xfrm>
+            <a:off x="2731775" y="7208957"/>
+            <a:ext cx="1293944" cy="830997"/>
+          </a:xfrm>
+          <a:prstGeom prst="rect">
+            <a:avLst/>
+          </a:prstGeom>
+          <a:noFill/>
+        </p:spPr>
+        <p:txBody>
+          <a:bodyPr wrap="none" rtlCol="0">
+            <a:spAutoFit/>
+          </a:bodyPr>
+          <a:lstStyle/>
+          <a:p>
+            <a:pPr marL="285750" indent="-285750">
+              <a:buFontTx/>
+              <a:buChar char="-"/>
+            </a:pPr>
+            <a:r>
+              <a:rPr lang="zh-CN" altLang="en-US" sz="1600" dirty="0" smtClean="0">
+                <a:latin typeface="仿宋" panose="02010609060101010101" pitchFamily="49" charset="-122"/>
+                <a:ea typeface="仿宋" panose="02010609060101010101" pitchFamily="49" charset="-122"/>
+              </a:rPr>
+              <a:t>实验设计</a:t>
+            </a:r>
+            <a:endParaRPr lang="en-US" altLang="zh-CN" sz="1600" dirty="0" smtClean="0">
+              <a:latin typeface="仿宋" panose="02010609060101010101" pitchFamily="49" charset="-122"/>
+              <a:ea typeface="仿宋" panose="02010609060101010101" pitchFamily="49" charset="-122"/>
+            </a:endParaRPr>
+          </a:p>
+          <a:p>
+            <a:pPr marL="285750" indent="-285750">
+              <a:buFontTx/>
+              <a:buChar char="-"/>
+            </a:pPr>
+            <a:r>
+              <a:rPr lang="zh-CN" altLang="en-US" sz="1600" dirty="0" smtClean="0">
+                <a:latin typeface="仿宋" panose="02010609060101010101" pitchFamily="49" charset="-122"/>
+                <a:ea typeface="仿宋" panose="02010609060101010101" pitchFamily="49" charset="-122"/>
+              </a:rPr>
+              <a:t>实验评估</a:t>
+            </a:r>
+            <a:endParaRPr lang="en-US" altLang="zh-CN" sz="1600" dirty="0" smtClean="0">
+              <a:latin typeface="仿宋" panose="02010609060101010101" pitchFamily="49" charset="-122"/>
+              <a:ea typeface="仿宋" panose="02010609060101010101" pitchFamily="49" charset="-122"/>
+            </a:endParaRPr>
+          </a:p>
+          <a:p>
+            <a:pPr marL="285750" indent="-285750">
+              <a:buFontTx/>
+              <a:buChar char="-"/>
+            </a:pPr>
+            <a:r>
+              <a:rPr lang="zh-CN" altLang="en-US" sz="1600" dirty="0" smtClean="0">
+                <a:latin typeface="仿宋" panose="02010609060101010101" pitchFamily="49" charset="-122"/>
+                <a:ea typeface="仿宋" panose="02010609060101010101" pitchFamily="49" charset="-122"/>
+              </a:rPr>
+              <a:t>实验结果</a:t>
+            </a:r>
+            <a:endParaRPr lang="en-US" sz="1600" dirty="0">
+              <a:latin typeface="仿宋" panose="02010609060101010101" pitchFamily="49" charset="-122"/>
+              <a:ea typeface="仿宋" panose="02010609060101010101" pitchFamily="49" charset="-122"/>
+            </a:endParaRPr>
+          </a:p>
+        </p:txBody>
+      </p:sp>
     </p:spTree>
     <p:extLst>
       <p:ext uri="{BB962C8B-B14F-4D97-AF65-F5344CB8AC3E}">

</xml_diff>

<commit_message>
push.sh at 2019年06月10日 17:22:04
</commit_message>
<xml_diff>
--- a/chap/img/thesis_structure.pptx
+++ b/chap/img/thesis_structure.pptx
@@ -3635,8 +3635,8 @@
         </p:nvSpPr>
         <p:spPr>
           <a:xfrm>
-            <a:off x="2272516" y="2145927"/>
-            <a:ext cx="2212465" cy="584775"/>
+            <a:off x="978101" y="2145927"/>
+            <a:ext cx="4801314" cy="338554"/>
           </a:xfrm>
           <a:prstGeom prst="rect">
             <a:avLst/>
@@ -3669,21 +3669,22 @@
                 <a:latin typeface="黑体" panose="02010609060101010101" pitchFamily="49" charset="-122"/>
                 <a:ea typeface="黑体" panose="02010609060101010101" pitchFamily="49" charset="-122"/>
               </a:rPr>
-              <a:t>分析现有</a:t>
-            </a:r>
-            <a:r>
-              <a:rPr lang="zh-CN" altLang="en-US" sz="1600" dirty="0">
+              <a:t>根据</a:t>
+            </a:r>
+            <a:r>
+              <a:rPr lang="zh-CN" altLang="en-US" sz="1600" dirty="0" smtClean="0">
                 <a:latin typeface="黑体" panose="02010609060101010101" pitchFamily="49" charset="-122"/>
                 <a:ea typeface="黑体" panose="02010609060101010101" pitchFamily="49" charset="-122"/>
               </a:rPr>
-              <a:t>算法</a:t>
-            </a:r>
-            <a:endParaRPr lang="en-US" altLang="zh-CN" sz="1600" dirty="0">
-              <a:latin typeface="黑体" panose="02010609060101010101" pitchFamily="49" charset="-122"/>
-              <a:ea typeface="黑体" panose="02010609060101010101" pitchFamily="49" charset="-122"/>
-            </a:endParaRPr>
-          </a:p>
-          <a:p>
+              <a:t>研究内容分析</a:t>
+            </a:r>
+            <a:r>
+              <a:rPr lang="zh-CN" altLang="en-US" sz="1600" dirty="0" smtClean="0">
+                <a:latin typeface="黑体" panose="02010609060101010101" pitchFamily="49" charset="-122"/>
+                <a:ea typeface="黑体" panose="02010609060101010101" pitchFamily="49" charset="-122"/>
+              </a:rPr>
+              <a:t>现有的视频目标跟踪算法</a:t>
+            </a:r>
             <a:endParaRPr lang="en-US" sz="1600" dirty="0">
               <a:latin typeface="宋体" panose="02010600030101010101" pitchFamily="2" charset="-122"/>
               <a:ea typeface="宋体" panose="02010600030101010101" pitchFamily="2" charset="-122"/>
@@ -3964,8 +3965,8 @@
         </p:nvSpPr>
         <p:spPr>
           <a:xfrm>
-            <a:off x="2115122" y="5016817"/>
-            <a:ext cx="2339102" cy="338554"/>
+            <a:off x="921755" y="4989460"/>
+            <a:ext cx="4903907" cy="584775"/>
           </a:xfrm>
           <a:prstGeom prst="rect">
             <a:avLst/>
@@ -3978,6 +3979,7 @@
           </a:bodyPr>
           <a:lstStyle/>
           <a:p>
+            <a:pPr algn="ctr"/>
             <a:r>
               <a:rPr lang="zh-CN" altLang="en-US" sz="1600" dirty="0">
                 <a:latin typeface="黑体" panose="02010609060101010101" pitchFamily="49" charset="-122"/>
@@ -3997,82 +3999,73 @@
                 <a:latin typeface="黑体" panose="02010609060101010101" pitchFamily="49" charset="-122"/>
                 <a:ea typeface="黑体" panose="02010609060101010101" pitchFamily="49" charset="-122"/>
               </a:rPr>
-              <a:t>论文的理论</a:t>
+              <a:t>论文</a:t>
             </a:r>
             <a:r>
               <a:rPr lang="zh-CN" altLang="en-US" sz="1600" dirty="0" smtClean="0">
                 <a:latin typeface="黑体" panose="02010609060101010101" pitchFamily="49" charset="-122"/>
                 <a:ea typeface="黑体" panose="02010609060101010101" pitchFamily="49" charset="-122"/>
               </a:rPr>
-              <a:t>创新</a:t>
-            </a:r>
-            <a:endParaRPr lang="en-US" sz="1600" dirty="0">
+              <a:t>的主要研究内容</a:t>
+            </a:r>
+            <a:r>
+              <a:rPr lang="en-US" altLang="zh-CN" sz="1600" dirty="0" smtClean="0">
+                <a:latin typeface="黑体" panose="02010609060101010101" pitchFamily="49" charset="-122"/>
+                <a:ea typeface="黑体" panose="02010609060101010101" pitchFamily="49" charset="-122"/>
+              </a:rPr>
+              <a:t/>
+            </a:r>
+            <a:br>
+              <a:rPr lang="en-US" altLang="zh-CN" sz="1600" dirty="0" smtClean="0">
+                <a:latin typeface="黑体" panose="02010609060101010101" pitchFamily="49" charset="-122"/>
+                <a:ea typeface="黑体" panose="02010609060101010101" pitchFamily="49" charset="-122"/>
+              </a:rPr>
+            </a:br>
+            <a:r>
+              <a:rPr lang="zh-CN" altLang="en-US" sz="1600" dirty="0" smtClean="0">
+                <a:latin typeface="黑体" panose="02010609060101010101" pitchFamily="49" charset="-122"/>
+                <a:ea typeface="黑体" panose="02010609060101010101" pitchFamily="49" charset="-122"/>
+              </a:rPr>
+              <a:t>将</a:t>
+            </a:r>
+            <a:r>
+              <a:rPr lang="en-US" altLang="zh-CN" sz="1600" dirty="0">
+                <a:latin typeface="黑体" panose="02010609060101010101" pitchFamily="49" charset="-122"/>
+                <a:ea typeface="黑体" panose="02010609060101010101" pitchFamily="49" charset="-122"/>
+              </a:rPr>
+              <a:t>RNN</a:t>
+            </a:r>
+            <a:r>
+              <a:rPr lang="zh-CN" altLang="en-US" sz="1600" dirty="0">
+                <a:latin typeface="黑体" panose="02010609060101010101" pitchFamily="49" charset="-122"/>
+                <a:ea typeface="黑体" panose="02010609060101010101" pitchFamily="49" charset="-122"/>
+              </a:rPr>
+              <a:t>插入编码</a:t>
+            </a:r>
+            <a:r>
+              <a:rPr lang="en-US" altLang="zh-CN" sz="1600" dirty="0">
+                <a:latin typeface="黑体" panose="02010609060101010101" pitchFamily="49" charset="-122"/>
+                <a:ea typeface="黑体" panose="02010609060101010101" pitchFamily="49" charset="-122"/>
+              </a:rPr>
+              <a:t>-</a:t>
+            </a:r>
+            <a:r>
+              <a:rPr lang="zh-CN" altLang="en-US" sz="1600" dirty="0">
+                <a:latin typeface="黑体" panose="02010609060101010101" pitchFamily="49" charset="-122"/>
+                <a:ea typeface="黑体" panose="02010609060101010101" pitchFamily="49" charset="-122"/>
+              </a:rPr>
+              <a:t>解码结构的像素级视频目标跟踪</a:t>
+            </a:r>
+            <a:r>
+              <a:rPr lang="zh-CN" altLang="en-US" sz="1600" dirty="0" smtClean="0">
+                <a:latin typeface="黑体" panose="02010609060101010101" pitchFamily="49" charset="-122"/>
+                <a:ea typeface="黑体" panose="02010609060101010101" pitchFamily="49" charset="-122"/>
+              </a:rPr>
+              <a:t>算法</a:t>
+            </a:r>
+            <a:endParaRPr lang="zh-CN" altLang="en-US" sz="1600" dirty="0">
               <a:latin typeface="黑体" panose="02010609060101010101" pitchFamily="49" charset="-122"/>
               <a:ea typeface="黑体" panose="02010609060101010101" pitchFamily="49" charset="-122"/>
-            </a:endParaRPr>
-          </a:p>
-        </p:txBody>
-      </p:sp>
-      <p:sp>
-        <p:nvSpPr>
-          <p:cNvPr id="33" name="文本框 32"/>
-          <p:cNvSpPr txBox="1"/>
-          <p:nvPr/>
-        </p:nvSpPr>
-        <p:spPr>
-          <a:xfrm>
-            <a:off x="946893" y="5344760"/>
-            <a:ext cx="5062604" cy="338554"/>
-          </a:xfrm>
-          <a:prstGeom prst="rect">
-            <a:avLst/>
-          </a:prstGeom>
-          <a:noFill/>
-        </p:spPr>
-        <p:txBody>
-          <a:bodyPr wrap="none" rtlCol="0">
-            <a:spAutoFit/>
-          </a:bodyPr>
-          <a:lstStyle/>
-          <a:p>
-            <a:r>
-              <a:rPr lang="zh-CN" altLang="en-US" sz="1600" dirty="0" smtClean="0">
-                <a:latin typeface="仿宋" panose="02010609060101010101" pitchFamily="49" charset="-122"/>
-                <a:ea typeface="仿宋" panose="02010609060101010101" pitchFamily="49" charset="-122"/>
-              </a:rPr>
-              <a:t>将</a:t>
-            </a:r>
-            <a:r>
-              <a:rPr lang="en-US" altLang="zh-CN" sz="1600" dirty="0" smtClean="0">
-                <a:latin typeface="仿宋" panose="02010609060101010101" pitchFamily="49" charset="-122"/>
-                <a:ea typeface="仿宋" panose="02010609060101010101" pitchFamily="49" charset="-122"/>
-              </a:rPr>
-              <a:t>RNN</a:t>
-            </a:r>
-            <a:r>
-              <a:rPr lang="zh-CN" altLang="en-US" sz="1600" dirty="0" smtClean="0">
-                <a:latin typeface="仿宋" panose="02010609060101010101" pitchFamily="49" charset="-122"/>
-                <a:ea typeface="仿宋" panose="02010609060101010101" pitchFamily="49" charset="-122"/>
-              </a:rPr>
-              <a:t>插入编码</a:t>
-            </a:r>
-            <a:r>
-              <a:rPr lang="en-US" altLang="zh-CN" sz="1600" dirty="0" smtClean="0">
-                <a:latin typeface="仿宋" panose="02010609060101010101" pitchFamily="49" charset="-122"/>
-                <a:ea typeface="仿宋" panose="02010609060101010101" pitchFamily="49" charset="-122"/>
-              </a:rPr>
-              <a:t>-</a:t>
-            </a:r>
-            <a:r>
-              <a:rPr lang="zh-CN" altLang="en-US" sz="1600" dirty="0" smtClean="0">
-                <a:latin typeface="仿宋" panose="02010609060101010101" pitchFamily="49" charset="-122"/>
-                <a:ea typeface="仿宋" panose="02010609060101010101" pitchFamily="49" charset="-122"/>
-              </a:rPr>
-              <a:t>解码结构的像素级视频目标跟踪算法</a:t>
-            </a:r>
-            <a:endParaRPr lang="en-US" sz="1600" dirty="0">
-              <a:latin typeface="仿宋" panose="02010609060101010101" pitchFamily="49" charset="-122"/>
-              <a:ea typeface="仿宋" panose="02010609060101010101" pitchFamily="49" charset="-122"/>
             </a:endParaRPr>
           </a:p>
         </p:txBody>
@@ -4130,6 +4123,55 @@
               </a:rPr>
               <a:t>空间维度处理</a:t>
             </a:r>
+            <a:r>
+              <a:rPr lang="en-US" altLang="zh-CN" sz="1600" dirty="0" smtClean="0">
+                <a:solidFill>
+                  <a:schemeClr val="tx1"/>
+                </a:solidFill>
+                <a:latin typeface="宋体" panose="02010600030101010101" pitchFamily="2" charset="-122"/>
+                <a:ea typeface="宋体" panose="02010600030101010101" pitchFamily="2" charset="-122"/>
+              </a:rPr>
+              <a:t/>
+            </a:r>
+            <a:br>
+              <a:rPr lang="en-US" altLang="zh-CN" sz="1600" dirty="0" smtClean="0">
+                <a:solidFill>
+                  <a:schemeClr val="tx1"/>
+                </a:solidFill>
+                <a:latin typeface="宋体" panose="02010600030101010101" pitchFamily="2" charset="-122"/>
+                <a:ea typeface="宋体" panose="02010600030101010101" pitchFamily="2" charset="-122"/>
+              </a:rPr>
+            </a:br>
+            <a:r>
+              <a:rPr lang="zh-CN" altLang="en-US" sz="1600" dirty="0" smtClean="0">
+                <a:solidFill>
+                  <a:schemeClr val="tx1"/>
+                </a:solidFill>
+                <a:latin typeface="宋体" panose="02010600030101010101" pitchFamily="2" charset="-122"/>
+                <a:ea typeface="宋体" panose="02010600030101010101" pitchFamily="2" charset="-122"/>
+              </a:rPr>
+              <a:t>编码</a:t>
+            </a:r>
+            <a:r>
+              <a:rPr lang="en-US" altLang="zh-CN" sz="1600" dirty="0" smtClean="0">
+                <a:solidFill>
+                  <a:schemeClr val="tx1"/>
+                </a:solidFill>
+                <a:latin typeface="宋体" panose="02010600030101010101" pitchFamily="2" charset="-122"/>
+                <a:ea typeface="宋体" panose="02010600030101010101" pitchFamily="2" charset="-122"/>
+              </a:rPr>
+              <a:t>-</a:t>
+            </a:r>
+            <a:r>
+              <a:rPr lang="zh-CN" altLang="en-US" sz="1600" dirty="0" smtClean="0">
+                <a:solidFill>
+                  <a:schemeClr val="tx1"/>
+                </a:solidFill>
+                <a:latin typeface="宋体" panose="02010600030101010101" pitchFamily="2" charset="-122"/>
+                <a:ea typeface="宋体" panose="02010600030101010101" pitchFamily="2" charset="-122"/>
+              </a:rPr>
+              <a:t>解码结构</a:t>
+            </a:r>
             <a:endParaRPr lang="en-US" sz="1600" dirty="0">
               <a:solidFill>
                 <a:schemeClr val="tx1"/>
@@ -4193,6 +4235,35 @@
               </a:rPr>
               <a:t>时间维度处理</a:t>
             </a:r>
+            <a:r>
+              <a:rPr lang="en-US" altLang="zh-CN" sz="1600" dirty="0" smtClean="0">
+                <a:solidFill>
+                  <a:schemeClr val="tx1"/>
+                </a:solidFill>
+                <a:latin typeface="宋体" panose="02010600030101010101" pitchFamily="2" charset="-122"/>
+                <a:ea typeface="宋体" panose="02010600030101010101" pitchFamily="2" charset="-122"/>
+              </a:rPr>
+              <a:t/>
+            </a:r>
+            <a:br>
+              <a:rPr lang="en-US" altLang="zh-CN" sz="1600" dirty="0" smtClean="0">
+                <a:solidFill>
+                  <a:schemeClr val="tx1"/>
+                </a:solidFill>
+                <a:latin typeface="宋体" panose="02010600030101010101" pitchFamily="2" charset="-122"/>
+                <a:ea typeface="宋体" panose="02010600030101010101" pitchFamily="2" charset="-122"/>
+              </a:rPr>
+            </a:br>
+            <a:r>
+              <a:rPr lang="en-US" altLang="zh-CN" sz="1600" dirty="0" smtClean="0">
+                <a:solidFill>
+                  <a:schemeClr val="tx1"/>
+                </a:solidFill>
+                <a:latin typeface="宋体" panose="02010600030101010101" pitchFamily="2" charset="-122"/>
+                <a:ea typeface="宋体" panose="02010600030101010101" pitchFamily="2" charset="-122"/>
+              </a:rPr>
+              <a:t>LSTM</a:t>
+            </a:r>
             <a:endParaRPr lang="en-US" sz="1600" dirty="0">
               <a:solidFill>
                 <a:schemeClr val="tx1"/>
@@ -4330,6 +4401,13 @@
   <p:clrMapOvr>
     <a:masterClrMapping/>
   </p:clrMapOvr>
+  <p:timing>
+    <p:tnLst>
+      <p:par>
+        <p:cTn id="1" dur="indefinite" restart="never" nodeType="tmRoot"/>
+      </p:par>
+    </p:tnLst>
+  </p:timing>
 </p:sld>
 </file>
 

</xml_diff>